<commit_message>
Add test cases and wireframe to presentation
</commit_message>
<xml_diff>
--- a/Specification/TourFirm(presentation).pptx
+++ b/Specification/TourFirm(presentation).pptx
@@ -5,7 +5,7 @@
     <p:sldMasterId id="2147483729" r:id="rId1"/>
   </p:sldMasterIdLst>
   <p:notesMasterIdLst>
-    <p:notesMasterId r:id="rId16"/>
+    <p:notesMasterId r:id="rId19"/>
   </p:notesMasterIdLst>
   <p:sldIdLst>
     <p:sldId id="257" r:id="rId2"/>
@@ -21,7 +21,10 @@
     <p:sldId id="267" r:id="rId12"/>
     <p:sldId id="268" r:id="rId13"/>
     <p:sldId id="269" r:id="rId14"/>
-    <p:sldId id="270" r:id="rId15"/>
+    <p:sldId id="271" r:id="rId15"/>
+    <p:sldId id="272" r:id="rId16"/>
+    <p:sldId id="273" r:id="rId17"/>
+    <p:sldId id="270" r:id="rId18"/>
   </p:sldIdLst>
   <p:sldSz cx="12192000" cy="6858000"/>
   <p:notesSz cx="6858000" cy="9144000"/>
@@ -120,6 +123,11 @@
       </a:defRPr>
     </a:lvl9pPr>
   </p:defaultTextStyle>
+  <p:extLst>
+    <p:ext uri="{EFAFB233-063F-42B5-8137-9DF3F51BA10A}">
+      <p15:sldGuideLst xmlns:p15="http://schemas.microsoft.com/office/powerpoint/2012/main"/>
+    </p:ext>
+  </p:extLst>
 </p:presentation>
 </file>
 
@@ -205,7 +213,7 @@
           <a:p>
             <a:fld id="{7AF5F660-0FA1-49ED-8445-2591E830ACDB}" type="datetimeFigureOut">
               <a:rPr lang="en-US" smtClean="0"/>
-              <a:t>3/24/2022</a:t>
+              <a:t>5/19/2022</a:t>
             </a:fld>
             <a:endParaRPr lang="en-US"/>
           </a:p>
@@ -2343,7 +2351,7 @@
           <a:p>
             <a:fld id="{E757C01E-AC1D-448A-A3C7-E84A54E99BC4}" type="datetimeFigureOut">
               <a:rPr lang="en-US" smtClean="0"/>
-              <a:t>3/24/2022</a:t>
+              <a:t>5/19/2022</a:t>
             </a:fld>
             <a:endParaRPr lang="en-US"/>
           </a:p>
@@ -2681,7 +2689,7 @@
           <a:p>
             <a:fld id="{E757C01E-AC1D-448A-A3C7-E84A54E99BC4}" type="datetimeFigureOut">
               <a:rPr lang="en-US" smtClean="0"/>
-              <a:t>3/24/2022</a:t>
+              <a:t>5/19/2022</a:t>
             </a:fld>
             <a:endParaRPr lang="en-US"/>
           </a:p>
@@ -3082,7 +3090,7 @@
           <a:p>
             <a:fld id="{E757C01E-AC1D-448A-A3C7-E84A54E99BC4}" type="datetimeFigureOut">
               <a:rPr lang="en-US" smtClean="0"/>
-              <a:t>3/24/2022</a:t>
+              <a:t>5/19/2022</a:t>
             </a:fld>
             <a:endParaRPr lang="en-US"/>
           </a:p>
@@ -3418,7 +3426,7 @@
           <a:p>
             <a:fld id="{E757C01E-AC1D-448A-A3C7-E84A54E99BC4}" type="datetimeFigureOut">
               <a:rPr lang="en-US" smtClean="0"/>
-              <a:t>3/24/2022</a:t>
+              <a:t>5/19/2022</a:t>
             </a:fld>
             <a:endParaRPr lang="en-US"/>
           </a:p>
@@ -3738,7 +3746,7 @@
           <a:p>
             <a:fld id="{E757C01E-AC1D-448A-A3C7-E84A54E99BC4}" type="datetimeFigureOut">
               <a:rPr lang="en-US" smtClean="0"/>
-              <a:t>3/24/2022</a:t>
+              <a:t>5/19/2022</a:t>
             </a:fld>
             <a:endParaRPr lang="en-US"/>
           </a:p>
@@ -4134,7 +4142,7 @@
           <a:p>
             <a:fld id="{E757C01E-AC1D-448A-A3C7-E84A54E99BC4}" type="datetimeFigureOut">
               <a:rPr lang="en-US" smtClean="0"/>
-              <a:t>3/24/2022</a:t>
+              <a:t>5/19/2022</a:t>
             </a:fld>
             <a:endParaRPr lang="en-US"/>
           </a:p>
@@ -4391,7 +4399,7 @@
           <a:p>
             <a:fld id="{E757C01E-AC1D-448A-A3C7-E84A54E99BC4}" type="datetimeFigureOut">
               <a:rPr lang="en-US" smtClean="0"/>
-              <a:t>3/24/2022</a:t>
+              <a:t>5/19/2022</a:t>
             </a:fld>
             <a:endParaRPr lang="en-US"/>
           </a:p>
@@ -4653,7 +4661,7 @@
           <a:p>
             <a:fld id="{E757C01E-AC1D-448A-A3C7-E84A54E99BC4}" type="datetimeFigureOut">
               <a:rPr lang="en-US" smtClean="0"/>
-              <a:t>3/24/2022</a:t>
+              <a:t>5/19/2022</a:t>
             </a:fld>
             <a:endParaRPr lang="en-US"/>
           </a:p>
@@ -5274,7 +5282,7 @@
           <a:p>
             <a:fld id="{E757C01E-AC1D-448A-A3C7-E84A54E99BC4}" type="datetimeFigureOut">
               <a:rPr lang="en-US" smtClean="0"/>
-              <a:t>3/24/2022</a:t>
+              <a:t>5/19/2022</a:t>
             </a:fld>
             <a:endParaRPr lang="en-US"/>
           </a:p>
@@ -5603,7 +5611,7 @@
           <a:p>
             <a:fld id="{E757C01E-AC1D-448A-A3C7-E84A54E99BC4}" type="datetimeFigureOut">
               <a:rPr lang="en-US" smtClean="0"/>
-              <a:t>3/24/2022</a:t>
+              <a:t>5/19/2022</a:t>
             </a:fld>
             <a:endParaRPr lang="en-US"/>
           </a:p>
@@ -5926,7 +5934,7 @@
           <a:p>
             <a:fld id="{E757C01E-AC1D-448A-A3C7-E84A54E99BC4}" type="datetimeFigureOut">
               <a:rPr lang="en-US" smtClean="0"/>
-              <a:t>3/24/2022</a:t>
+              <a:t>5/19/2022</a:t>
             </a:fld>
             <a:endParaRPr lang="en-US"/>
           </a:p>
@@ -6383,7 +6391,7 @@
           <a:p>
             <a:fld id="{E757C01E-AC1D-448A-A3C7-E84A54E99BC4}" type="datetimeFigureOut">
               <a:rPr lang="en-US" smtClean="0"/>
-              <a:t>3/24/2022</a:t>
+              <a:t>5/19/2022</a:t>
             </a:fld>
             <a:endParaRPr lang="en-US"/>
           </a:p>
@@ -6588,7 +6596,7 @@
           <a:p>
             <a:fld id="{E757C01E-AC1D-448A-A3C7-E84A54E99BC4}" type="datetimeFigureOut">
               <a:rPr lang="en-US" smtClean="0"/>
-              <a:t>3/24/2022</a:t>
+              <a:t>5/19/2022</a:t>
             </a:fld>
             <a:endParaRPr lang="en-US"/>
           </a:p>
@@ -6765,7 +6773,7 @@
           <a:p>
             <a:fld id="{E757C01E-AC1D-448A-A3C7-E84A54E99BC4}" type="datetimeFigureOut">
               <a:rPr lang="en-US" smtClean="0"/>
-              <a:t>3/24/2022</a:t>
+              <a:t>5/19/2022</a:t>
             </a:fld>
             <a:endParaRPr lang="en-US"/>
           </a:p>
@@ -7098,7 +7106,7 @@
           <a:p>
             <a:fld id="{E757C01E-AC1D-448A-A3C7-E84A54E99BC4}" type="datetimeFigureOut">
               <a:rPr lang="en-US" smtClean="0"/>
-              <a:t>3/24/2022</a:t>
+              <a:t>5/19/2022</a:t>
             </a:fld>
             <a:endParaRPr lang="en-US"/>
           </a:p>
@@ -7443,7 +7451,7 @@
           <a:p>
             <a:fld id="{E757C01E-AC1D-448A-A3C7-E84A54E99BC4}" type="datetimeFigureOut">
               <a:rPr lang="en-US" smtClean="0"/>
-              <a:t>3/24/2022</a:t>
+              <a:t>5/19/2022</a:t>
             </a:fld>
             <a:endParaRPr lang="en-US"/>
           </a:p>
@@ -9560,7 +9568,7 @@
           <a:p>
             <a:fld id="{E757C01E-AC1D-448A-A3C7-E84A54E99BC4}" type="datetimeFigureOut">
               <a:rPr lang="en-US" smtClean="0"/>
-              <a:t>3/24/2022</a:t>
+              <a:t>5/19/2022</a:t>
             </a:fld>
             <a:endParaRPr lang="en-US"/>
           </a:p>
@@ -11375,6 +11383,413 @@
 </file>
 
 <file path=ppt/slides/slide14.xml><?xml version="1.0" encoding="utf-8"?>
+<p:sld xmlns:a="http://schemas.openxmlformats.org/drawingml/2006/main" xmlns:r="http://schemas.openxmlformats.org/officeDocument/2006/relationships" xmlns:p="http://schemas.openxmlformats.org/presentationml/2006/main">
+  <p:cSld>
+    <p:spTree>
+      <p:nvGrpSpPr>
+        <p:cNvPr id="1" name=""/>
+        <p:cNvGrpSpPr/>
+        <p:nvPr/>
+      </p:nvGrpSpPr>
+      <p:grpSpPr>
+        <a:xfrm>
+          <a:off x="0" y="0"/>
+          <a:ext cx="0" cy="0"/>
+          <a:chOff x="0" y="0"/>
+          <a:chExt cx="0" cy="0"/>
+        </a:xfrm>
+      </p:grpSpPr>
+      <p:sp>
+        <p:nvSpPr>
+          <p:cNvPr id="2" name="Title 1">
+            <a:extLst>
+              <a:ext uri="{FF2B5EF4-FFF2-40B4-BE49-F238E27FC236}">
+                <a16:creationId xmlns:a16="http://schemas.microsoft.com/office/drawing/2014/main" id="{852F8C9E-F0C9-2EE9-9526-46098D53AA68}"/>
+              </a:ext>
+            </a:extLst>
+          </p:cNvPr>
+          <p:cNvSpPr>
+            <a:spLocks noGrp="1"/>
+          </p:cNvSpPr>
+          <p:nvPr>
+            <p:ph type="title"/>
+          </p:nvPr>
+        </p:nvSpPr>
+        <p:spPr/>
+        <p:txBody>
+          <a:bodyPr/>
+          <a:lstStyle/>
+          <a:p>
+            <a:endParaRPr lang="en-US"/>
+          </a:p>
+        </p:txBody>
+      </p:sp>
+      <p:sp>
+        <p:nvSpPr>
+          <p:cNvPr id="3" name="Content Placeholder 2">
+            <a:extLst>
+              <a:ext uri="{FF2B5EF4-FFF2-40B4-BE49-F238E27FC236}">
+                <a16:creationId xmlns:a16="http://schemas.microsoft.com/office/drawing/2014/main" id="{8E2D6232-9A76-B5BC-35D5-0C7ED856A5EA}"/>
+              </a:ext>
+            </a:extLst>
+          </p:cNvPr>
+          <p:cNvSpPr>
+            <a:spLocks noGrp="1"/>
+          </p:cNvSpPr>
+          <p:nvPr>
+            <p:ph idx="1"/>
+          </p:nvPr>
+        </p:nvSpPr>
+        <p:spPr/>
+        <p:txBody>
+          <a:bodyPr/>
+          <a:lstStyle/>
+          <a:p>
+            <a:endParaRPr lang="en-US" dirty="0"/>
+          </a:p>
+        </p:txBody>
+      </p:sp>
+      <p:pic>
+        <p:nvPicPr>
+          <p:cNvPr id="5" name="Picture 4">
+            <a:extLst>
+              <a:ext uri="{FF2B5EF4-FFF2-40B4-BE49-F238E27FC236}">
+                <a16:creationId xmlns:a16="http://schemas.microsoft.com/office/drawing/2014/main" id="{553D7E48-CAEC-84EE-9CB1-2C026E82F754}"/>
+              </a:ext>
+            </a:extLst>
+          </p:cNvPr>
+          <p:cNvPicPr>
+            <a:picLocks noChangeAspect="1"/>
+          </p:cNvPicPr>
+          <p:nvPr/>
+        </p:nvPicPr>
+        <p:blipFill>
+          <a:blip r:embed="rId2"/>
+          <a:stretch>
+            <a:fillRect/>
+          </a:stretch>
+        </p:blipFill>
+        <p:spPr>
+          <a:xfrm>
+            <a:off x="904151" y="121841"/>
+            <a:ext cx="9027790" cy="5789381"/>
+          </a:xfrm>
+          <a:prstGeom prst="rect">
+            <a:avLst/>
+          </a:prstGeom>
+        </p:spPr>
+      </p:pic>
+      <p:pic>
+        <p:nvPicPr>
+          <p:cNvPr id="7" name="Picture 6">
+            <a:extLst>
+              <a:ext uri="{FF2B5EF4-FFF2-40B4-BE49-F238E27FC236}">
+                <a16:creationId xmlns:a16="http://schemas.microsoft.com/office/drawing/2014/main" id="{82FB35B7-6757-0CB3-C6C4-01F5BD0D3D83}"/>
+              </a:ext>
+            </a:extLst>
+          </p:cNvPr>
+          <p:cNvPicPr>
+            <a:picLocks noChangeAspect="1"/>
+          </p:cNvPicPr>
+          <p:nvPr/>
+        </p:nvPicPr>
+        <p:blipFill rotWithShape="1">
+          <a:blip r:embed="rId3"/>
+          <a:srcRect t="11644"/>
+          <a:stretch/>
+        </p:blipFill>
+        <p:spPr>
+          <a:xfrm>
+            <a:off x="874967" y="5807413"/>
+            <a:ext cx="9027790" cy="765729"/>
+          </a:xfrm>
+          <a:prstGeom prst="rect">
+            <a:avLst/>
+          </a:prstGeom>
+        </p:spPr>
+      </p:pic>
+    </p:spTree>
+    <p:extLst>
+      <p:ext uri="{BB962C8B-B14F-4D97-AF65-F5344CB8AC3E}">
+        <p14:creationId xmlns:p14="http://schemas.microsoft.com/office/powerpoint/2010/main" val="1443842508"/>
+      </p:ext>
+    </p:extLst>
+  </p:cSld>
+  <p:clrMapOvr>
+    <a:masterClrMapping/>
+  </p:clrMapOvr>
+</p:sld>
+</file>
+
+<file path=ppt/slides/slide15.xml><?xml version="1.0" encoding="utf-8"?>
+<p:sld xmlns:a="http://schemas.openxmlformats.org/drawingml/2006/main" xmlns:r="http://schemas.openxmlformats.org/officeDocument/2006/relationships" xmlns:p="http://schemas.openxmlformats.org/presentationml/2006/main">
+  <p:cSld>
+    <p:spTree>
+      <p:nvGrpSpPr>
+        <p:cNvPr id="1" name=""/>
+        <p:cNvGrpSpPr/>
+        <p:nvPr/>
+      </p:nvGrpSpPr>
+      <p:grpSpPr>
+        <a:xfrm>
+          <a:off x="0" y="0"/>
+          <a:ext cx="0" cy="0"/>
+          <a:chOff x="0" y="0"/>
+          <a:chExt cx="0" cy="0"/>
+        </a:xfrm>
+      </p:grpSpPr>
+      <p:sp>
+        <p:nvSpPr>
+          <p:cNvPr id="2" name="Title 1">
+            <a:extLst>
+              <a:ext uri="{FF2B5EF4-FFF2-40B4-BE49-F238E27FC236}">
+                <a16:creationId xmlns:a16="http://schemas.microsoft.com/office/drawing/2014/main" id="{6F09689A-279B-3BAF-72F0-3338DAE9247B}"/>
+              </a:ext>
+            </a:extLst>
+          </p:cNvPr>
+          <p:cNvSpPr>
+            <a:spLocks noGrp="1"/>
+          </p:cNvSpPr>
+          <p:nvPr>
+            <p:ph type="title"/>
+          </p:nvPr>
+        </p:nvSpPr>
+        <p:spPr>
+          <a:xfrm>
+            <a:off x="567056" y="98260"/>
+            <a:ext cx="8911687" cy="1280890"/>
+          </a:xfrm>
+        </p:spPr>
+        <p:txBody>
+          <a:bodyPr/>
+          <a:lstStyle/>
+          <a:p>
+            <a:r>
+              <a:rPr lang="en-US" dirty="0"/>
+              <a:t>Wireframe:</a:t>
+            </a:r>
+          </a:p>
+        </p:txBody>
+      </p:sp>
+      <p:sp>
+        <p:nvSpPr>
+          <p:cNvPr id="3" name="Content Placeholder 2">
+            <a:extLst>
+              <a:ext uri="{FF2B5EF4-FFF2-40B4-BE49-F238E27FC236}">
+                <a16:creationId xmlns:a16="http://schemas.microsoft.com/office/drawing/2014/main" id="{073430C0-7C11-E7AC-3332-9C6019D76E64}"/>
+              </a:ext>
+            </a:extLst>
+          </p:cNvPr>
+          <p:cNvSpPr>
+            <a:spLocks noGrp="1"/>
+          </p:cNvSpPr>
+          <p:nvPr>
+            <p:ph idx="1"/>
+          </p:nvPr>
+        </p:nvSpPr>
+        <p:spPr/>
+        <p:txBody>
+          <a:bodyPr/>
+          <a:lstStyle/>
+          <a:p>
+            <a:endParaRPr lang="en-US"/>
+          </a:p>
+        </p:txBody>
+      </p:sp>
+      <p:pic>
+        <p:nvPicPr>
+          <p:cNvPr id="5" name="Picture 4">
+            <a:extLst>
+              <a:ext uri="{FF2B5EF4-FFF2-40B4-BE49-F238E27FC236}">
+                <a16:creationId xmlns:a16="http://schemas.microsoft.com/office/drawing/2014/main" id="{B89B2BFA-5265-D3C5-1256-DA3CD821F5CF}"/>
+              </a:ext>
+            </a:extLst>
+          </p:cNvPr>
+          <p:cNvPicPr>
+            <a:picLocks noChangeAspect="1"/>
+          </p:cNvPicPr>
+          <p:nvPr/>
+        </p:nvPicPr>
+        <p:blipFill>
+          <a:blip r:embed="rId2"/>
+          <a:stretch>
+            <a:fillRect/>
+          </a:stretch>
+        </p:blipFill>
+        <p:spPr>
+          <a:xfrm>
+            <a:off x="252248" y="1108817"/>
+            <a:ext cx="11939752" cy="5352536"/>
+          </a:xfrm>
+          <a:prstGeom prst="rect">
+            <a:avLst/>
+          </a:prstGeom>
+        </p:spPr>
+      </p:pic>
+      <p:sp>
+        <p:nvSpPr>
+          <p:cNvPr id="6" name="TextBox 5">
+            <a:extLst>
+              <a:ext uri="{FF2B5EF4-FFF2-40B4-BE49-F238E27FC236}">
+                <a16:creationId xmlns:a16="http://schemas.microsoft.com/office/drawing/2014/main" id="{393C8FF4-33AD-5ECF-9788-232EA73090E9}"/>
+              </a:ext>
+            </a:extLst>
+          </p:cNvPr>
+          <p:cNvSpPr txBox="1"/>
+          <p:nvPr/>
+        </p:nvSpPr>
+        <p:spPr>
+          <a:xfrm>
+            <a:off x="3134654" y="6390408"/>
+            <a:ext cx="7127272" cy="369332"/>
+          </a:xfrm>
+          <a:prstGeom prst="rect">
+            <a:avLst/>
+          </a:prstGeom>
+          <a:noFill/>
+        </p:spPr>
+        <p:txBody>
+          <a:bodyPr wrap="none" rtlCol="0">
+            <a:spAutoFit/>
+          </a:bodyPr>
+          <a:lstStyle/>
+          <a:p>
+            <a:r>
+              <a:rPr lang="en-US" b="0" i="0" u="none" strike="noStrike" dirty="0">
+                <a:effectLst/>
+                <a:latin typeface="Roboto" panose="02000000000000000000" pitchFamily="2" charset="0"/>
+                <a:hlinkClick r:id="rId3" tooltip="https://projects.invisionapp.com/freehand/document/KGMOweeWr"/>
+              </a:rPr>
+              <a:t>https://projects.invisionapp.com/freehand/document/KGMOweeWr</a:t>
+            </a:r>
+            <a:endParaRPr lang="en-US" dirty="0"/>
+          </a:p>
+        </p:txBody>
+      </p:sp>
+    </p:spTree>
+    <p:extLst>
+      <p:ext uri="{BB962C8B-B14F-4D97-AF65-F5344CB8AC3E}">
+        <p14:creationId xmlns:p14="http://schemas.microsoft.com/office/powerpoint/2010/main" val="2338818171"/>
+      </p:ext>
+    </p:extLst>
+  </p:cSld>
+  <p:clrMapOvr>
+    <a:masterClrMapping/>
+  </p:clrMapOvr>
+</p:sld>
+</file>
+
+<file path=ppt/slides/slide16.xml><?xml version="1.0" encoding="utf-8"?>
+<p:sld xmlns:a="http://schemas.openxmlformats.org/drawingml/2006/main" xmlns:r="http://schemas.openxmlformats.org/officeDocument/2006/relationships" xmlns:p="http://schemas.openxmlformats.org/presentationml/2006/main">
+  <p:cSld>
+    <p:spTree>
+      <p:nvGrpSpPr>
+        <p:cNvPr id="1" name=""/>
+        <p:cNvGrpSpPr/>
+        <p:nvPr/>
+      </p:nvGrpSpPr>
+      <p:grpSpPr>
+        <a:xfrm>
+          <a:off x="0" y="0"/>
+          <a:ext cx="0" cy="0"/>
+          <a:chOff x="0" y="0"/>
+          <a:chExt cx="0" cy="0"/>
+        </a:xfrm>
+      </p:grpSpPr>
+      <p:sp>
+        <p:nvSpPr>
+          <p:cNvPr id="2" name="Title 1">
+            <a:extLst>
+              <a:ext uri="{FF2B5EF4-FFF2-40B4-BE49-F238E27FC236}">
+                <a16:creationId xmlns:a16="http://schemas.microsoft.com/office/drawing/2014/main" id="{17CEAF0C-2FDB-2293-59F5-C746EF9852FB}"/>
+              </a:ext>
+            </a:extLst>
+          </p:cNvPr>
+          <p:cNvSpPr>
+            <a:spLocks noGrp="1"/>
+          </p:cNvSpPr>
+          <p:nvPr>
+            <p:ph type="title"/>
+          </p:nvPr>
+        </p:nvSpPr>
+        <p:spPr/>
+        <p:txBody>
+          <a:bodyPr/>
+          <a:lstStyle/>
+          <a:p>
+            <a:endParaRPr lang="en-US"/>
+          </a:p>
+        </p:txBody>
+      </p:sp>
+      <p:sp>
+        <p:nvSpPr>
+          <p:cNvPr id="3" name="Content Placeholder 2">
+            <a:extLst>
+              <a:ext uri="{FF2B5EF4-FFF2-40B4-BE49-F238E27FC236}">
+                <a16:creationId xmlns:a16="http://schemas.microsoft.com/office/drawing/2014/main" id="{09C8D68B-959B-53D1-B14D-2FE87CB8E3AE}"/>
+              </a:ext>
+            </a:extLst>
+          </p:cNvPr>
+          <p:cNvSpPr>
+            <a:spLocks noGrp="1"/>
+          </p:cNvSpPr>
+          <p:nvPr>
+            <p:ph idx="1"/>
+          </p:nvPr>
+        </p:nvSpPr>
+        <p:spPr/>
+        <p:txBody>
+          <a:bodyPr/>
+          <a:lstStyle/>
+          <a:p>
+            <a:endParaRPr lang="en-US"/>
+          </a:p>
+        </p:txBody>
+      </p:sp>
+      <p:pic>
+        <p:nvPicPr>
+          <p:cNvPr id="5" name="Picture 4">
+            <a:extLst>
+              <a:ext uri="{FF2B5EF4-FFF2-40B4-BE49-F238E27FC236}">
+                <a16:creationId xmlns:a16="http://schemas.microsoft.com/office/drawing/2014/main" id="{37F59D74-3456-ECBC-7965-A44955563DCB}"/>
+              </a:ext>
+            </a:extLst>
+          </p:cNvPr>
+          <p:cNvPicPr>
+            <a:picLocks noChangeAspect="1"/>
+          </p:cNvPicPr>
+          <p:nvPr/>
+        </p:nvPicPr>
+        <p:blipFill>
+          <a:blip r:embed="rId2"/>
+          <a:stretch>
+            <a:fillRect/>
+          </a:stretch>
+        </p:blipFill>
+        <p:spPr>
+          <a:xfrm>
+            <a:off x="191744" y="268013"/>
+            <a:ext cx="12000256" cy="6424627"/>
+          </a:xfrm>
+          <a:prstGeom prst="rect">
+            <a:avLst/>
+          </a:prstGeom>
+        </p:spPr>
+      </p:pic>
+    </p:spTree>
+    <p:extLst>
+      <p:ext uri="{BB962C8B-B14F-4D97-AF65-F5344CB8AC3E}">
+        <p14:creationId xmlns:p14="http://schemas.microsoft.com/office/powerpoint/2010/main" val="257609620"/>
+      </p:ext>
+    </p:extLst>
+  </p:cSld>
+  <p:clrMapOvr>
+    <a:masterClrMapping/>
+  </p:clrMapOvr>
+</p:sld>
+</file>
+
+<file path=ppt/slides/slide17.xml><?xml version="1.0" encoding="utf-8"?>
 <p:sld xmlns:a="http://schemas.openxmlformats.org/drawingml/2006/main" xmlns:r="http://schemas.openxmlformats.org/officeDocument/2006/relationships" xmlns:p="http://schemas.openxmlformats.org/presentationml/2006/main">
   <p:cSld>
     <p:spTree>

</xml_diff>